<commit_message>
added in a bunch of missing files
</commit_message>
<xml_diff>
--- a/register user design.pptx
+++ b/register user design.pptx
@@ -710,11 +710,7 @@
             </a:r>
             <a:r>
               <a:rPr lang="en-US" baseline="0" dirty="0" smtClean="0"/>
-              <a:t> ahs to </a:t>
-            </a:r>
-            <a:r>
-              <a:rPr lang="en-US" baseline="0" smtClean="0"/>
-              <a:t>be unique</a:t>
+              <a:t> ahs to be unique</a:t>
             </a:r>
             <a:endParaRPr lang="en-US" dirty="0"/>
           </a:p>
@@ -5029,7 +5025,7 @@
         </p:nvSpPr>
         <p:spPr>
           <a:xfrm>
-            <a:off x="4321120" y="2173756"/>
+            <a:off x="4498579" y="2212950"/>
             <a:ext cx="838691" cy="369332"/>
           </a:xfrm>
           <a:prstGeom prst="rect">
@@ -5060,7 +5056,7 @@
         </p:nvSpPr>
         <p:spPr>
           <a:xfrm>
-            <a:off x="4569135" y="2692520"/>
+            <a:off x="4746594" y="2731714"/>
             <a:ext cx="590676" cy="369332"/>
           </a:xfrm>
           <a:prstGeom prst="rect">
@@ -5175,7 +5171,7 @@
         </p:nvSpPr>
         <p:spPr>
           <a:xfrm>
-            <a:off x="3766160" y="4362956"/>
+            <a:off x="3943619" y="4402150"/>
             <a:ext cx="1393651" cy="369332"/>
           </a:xfrm>
           <a:prstGeom prst="rect">
@@ -5290,7 +5286,7 @@
         </p:nvSpPr>
         <p:spPr>
           <a:xfrm>
-            <a:off x="4364330" y="3842050"/>
+            <a:off x="4167719" y="3881244"/>
             <a:ext cx="1169551" cy="369332"/>
           </a:xfrm>
           <a:prstGeom prst="rect">
@@ -5361,7 +5357,7 @@
         </p:nvSpPr>
         <p:spPr>
           <a:xfrm>
-            <a:off x="4205266" y="3249399"/>
+            <a:off x="4141172" y="3288593"/>
             <a:ext cx="1196098" cy="369332"/>
           </a:xfrm>
           <a:prstGeom prst="rect">

</xml_diff>